<commit_message>
ppt con metodo 1
</commit_message>
<xml_diff>
--- a/Recolección de Basura en C.pptx
+++ b/Recolección de Basura en C.pptx
@@ -129,6 +129,9 @@
           </p14:sldIdLst>
         </p14:section>
       </p14:sectionLst>
+    </p:ext>
+    <p:ext uri="{EFAFB233-063F-42B5-8137-9DF3F51BA10A}">
+      <p15:sldGuideLst xmlns:p15="http://schemas.microsoft.com/office/powerpoint/2012/main"/>
     </p:ext>
   </p:extLst>
 </p:presentation>
@@ -3208,8 +3211,13 @@
           <a:p>
             <a:r>
               <a:rPr lang="en-US" dirty="0" smtClean="0"/>
-              <a:t>Trade-off (Performance &gt; Convenience</a:t>
-            </a:r>
+              <a:t>Trade-off (Performance &gt; </a:t>
+            </a:r>
+            <a:r>
+              <a:rPr lang="en-US" dirty="0" smtClean="0"/>
+              <a:t>Convenience)</a:t>
+            </a:r>
+            <a:endParaRPr lang="en-US" dirty="0" smtClean="0"/>
           </a:p>
         </p:txBody>
       </p:sp>
@@ -3267,7 +3275,7 @@
           <a:p>
             <a:r>
               <a:rPr lang="en-US" dirty="0" err="1" smtClean="0"/>
-              <a:t>Librerías</a:t>
+              <a:t>Algunas</a:t>
             </a:r>
             <a:r>
               <a:rPr lang="en-US" dirty="0" smtClean="0"/>
@@ -3275,6 +3283,14 @@
             </a:r>
             <a:r>
               <a:rPr lang="en-US" dirty="0" err="1" smtClean="0"/>
+              <a:t>librerías</a:t>
+            </a:r>
+            <a:r>
+              <a:rPr lang="en-US" dirty="0" smtClean="0"/>
+              <a:t> </a:t>
+            </a:r>
+            <a:r>
+              <a:rPr lang="en-US" dirty="0" err="1" smtClean="0"/>
               <a:t>disponibles</a:t>
             </a:r>
             <a:endParaRPr lang="en-US" dirty="0"/>
@@ -3297,8 +3313,12 @@
           <a:lstStyle/>
           <a:p>
             <a:r>
-              <a:rPr lang="en-US" dirty="0" smtClean="0"/>
-              <a:t>Boehm GC</a:t>
+              <a:rPr lang="en-US" dirty="0"/>
+              <a:t>Boehm-Demers-Weiser GC Library (Boehm GC</a:t>
+            </a:r>
+            <a:r>
+              <a:rPr lang="en-US" dirty="0" smtClean="0"/>
+              <a:t>)</a:t>
             </a:r>
           </a:p>
           <a:p>
@@ -3312,13 +3332,7 @@
               <a:rPr lang="en-US" dirty="0" smtClean="0"/>
               <a:t>3</a:t>
             </a:r>
-          </a:p>
-          <a:p>
-            <a:r>
-              <a:rPr lang="en-US" dirty="0" err="1" smtClean="0"/>
-              <a:t>etc</a:t>
-            </a:r>
-            <a:endParaRPr lang="en-US" dirty="0"/>
+            <a:endParaRPr lang="en-US" dirty="0" smtClean="0"/>
           </a:p>
         </p:txBody>
       </p:sp>
@@ -3397,8 +3411,258 @@
           <a:p>
             <a:r>
               <a:rPr lang="en-US" dirty="0" err="1" smtClean="0"/>
-              <a:t>blabla</a:t>
-            </a:r>
+              <a:t>Una</a:t>
+            </a:r>
+            <a:r>
+              <a:rPr lang="en-US" dirty="0" smtClean="0"/>
+              <a:t> de </a:t>
+            </a:r>
+            <a:r>
+              <a:rPr lang="en-US" dirty="0" err="1" smtClean="0"/>
+              <a:t>las</a:t>
+            </a:r>
+            <a:r>
+              <a:rPr lang="en-US" dirty="0" smtClean="0"/>
+              <a:t> </a:t>
+            </a:r>
+            <a:r>
+              <a:rPr lang="es-EC" dirty="0"/>
+              <a:t>librerías </a:t>
+            </a:r>
+            <a:r>
+              <a:rPr lang="es-EC" dirty="0" smtClean="0"/>
+              <a:t>más</a:t>
+            </a:r>
+            <a:r>
+              <a:rPr lang="en-US" dirty="0" smtClean="0"/>
+              <a:t> </a:t>
+            </a:r>
+            <a:r>
+              <a:rPr lang="en-US" dirty="0" err="1" smtClean="0"/>
+              <a:t>utilizadas</a:t>
+            </a:r>
+            <a:r>
+              <a:rPr lang="en-US" dirty="0" smtClean="0"/>
+              <a:t> para </a:t>
+            </a:r>
+            <a:r>
+              <a:rPr lang="en-US" dirty="0" err="1" smtClean="0"/>
+              <a:t>brindarle</a:t>
+            </a:r>
+            <a:r>
+              <a:rPr lang="en-US" dirty="0" smtClean="0"/>
+              <a:t> a </a:t>
+            </a:r>
+            <a:r>
+              <a:rPr lang="en-US" dirty="0" err="1" smtClean="0"/>
+              <a:t>programas</a:t>
+            </a:r>
+            <a:r>
+              <a:rPr lang="en-US" dirty="0" smtClean="0"/>
+              <a:t> en C la </a:t>
+            </a:r>
+            <a:r>
+              <a:rPr lang="en-US" dirty="0" err="1" smtClean="0"/>
+              <a:t>capacidad</a:t>
+            </a:r>
+            <a:r>
+              <a:rPr lang="en-US" dirty="0" smtClean="0"/>
+              <a:t> de </a:t>
+            </a:r>
+            <a:r>
+              <a:rPr lang="en-US" dirty="0" err="1" smtClean="0"/>
+              <a:t>recolectar</a:t>
+            </a:r>
+            <a:r>
+              <a:rPr lang="en-US" dirty="0" smtClean="0"/>
+              <a:t> </a:t>
+            </a:r>
+            <a:r>
+              <a:rPr lang="en-US" dirty="0" err="1" smtClean="0"/>
+              <a:t>basura</a:t>
+            </a:r>
+            <a:r>
+              <a:rPr lang="en-US" dirty="0" smtClean="0"/>
+              <a:t>.</a:t>
+            </a:r>
+          </a:p>
+          <a:p>
+            <a:r>
+              <a:rPr lang="en-US" dirty="0" err="1" smtClean="0"/>
+              <a:t>Facil</a:t>
+            </a:r>
+            <a:r>
+              <a:rPr lang="en-US" dirty="0" smtClean="0"/>
+              <a:t> de </a:t>
+            </a:r>
+            <a:r>
+              <a:rPr lang="en-US" dirty="0" err="1" smtClean="0"/>
+              <a:t>utilizar</a:t>
+            </a:r>
+            <a:r>
+              <a:rPr lang="en-US" dirty="0" smtClean="0"/>
+              <a:t>. </a:t>
+            </a:r>
+            <a:r>
+              <a:rPr lang="en-US" dirty="0" smtClean="0"/>
+              <a:t>Para </a:t>
+            </a:r>
+            <a:r>
+              <a:rPr lang="en-US" dirty="0" err="1" smtClean="0"/>
+              <a:t>programas</a:t>
+            </a:r>
+            <a:r>
+              <a:rPr lang="en-US" dirty="0" smtClean="0"/>
+              <a:t> </a:t>
+            </a:r>
+            <a:r>
+              <a:rPr lang="en-US" dirty="0" err="1" smtClean="0"/>
+              <a:t>que</a:t>
+            </a:r>
+            <a:r>
+              <a:rPr lang="en-US" dirty="0" smtClean="0"/>
+              <a:t> </a:t>
+            </a:r>
+            <a:r>
+              <a:rPr lang="en-US" dirty="0" err="1" smtClean="0"/>
+              <a:t>ya</a:t>
+            </a:r>
+            <a:r>
+              <a:rPr lang="en-US" dirty="0" smtClean="0"/>
+              <a:t> </a:t>
+            </a:r>
+            <a:r>
+              <a:rPr lang="en-US" dirty="0" err="1" smtClean="0"/>
+              <a:t>utilicen</a:t>
+            </a:r>
+            <a:r>
+              <a:rPr lang="en-US" dirty="0" smtClean="0"/>
+              <a:t> </a:t>
+            </a:r>
+            <a:r>
+              <a:rPr lang="en-US" dirty="0" err="1" smtClean="0"/>
+              <a:t>gestión</a:t>
+            </a:r>
+            <a:r>
+              <a:rPr lang="en-US" dirty="0" smtClean="0"/>
+              <a:t> manual de </a:t>
+            </a:r>
+            <a:r>
+              <a:rPr lang="en-US" dirty="0" err="1" smtClean="0"/>
+              <a:t>memoria</a:t>
+            </a:r>
+            <a:r>
+              <a:rPr lang="en-US" dirty="0" smtClean="0"/>
+              <a:t>, solo </a:t>
+            </a:r>
+            <a:r>
+              <a:rPr lang="en-US" dirty="0" err="1" smtClean="0"/>
+              <a:t>basta</a:t>
+            </a:r>
+            <a:r>
+              <a:rPr lang="en-US" dirty="0" smtClean="0"/>
+              <a:t> con </a:t>
+            </a:r>
+            <a:r>
+              <a:rPr lang="en-US" dirty="0" err="1" smtClean="0"/>
+              <a:t>redefinir</a:t>
+            </a:r>
+            <a:r>
+              <a:rPr lang="en-US" dirty="0" smtClean="0"/>
+              <a:t> </a:t>
+            </a:r>
+            <a:r>
+              <a:rPr lang="en-US" dirty="0" err="1" smtClean="0"/>
+              <a:t>funciones</a:t>
+            </a:r>
+            <a:r>
+              <a:rPr lang="en-US" dirty="0"/>
+              <a:t>.</a:t>
+            </a:r>
+            <a:endParaRPr lang="en-US" dirty="0" smtClean="0"/>
+          </a:p>
+          <a:p>
+            <a:r>
+              <a:rPr lang="en-US" dirty="0" err="1" smtClean="0"/>
+              <a:t>Consiste</a:t>
+            </a:r>
+            <a:r>
+              <a:rPr lang="en-US" dirty="0" smtClean="0"/>
+              <a:t> de dos </a:t>
+            </a:r>
+            <a:r>
+              <a:rPr lang="en-US" dirty="0" err="1" smtClean="0"/>
+              <a:t>fases</a:t>
+            </a:r>
+            <a:r>
+              <a:rPr lang="en-US" dirty="0" smtClean="0"/>
+              <a:t>:</a:t>
+            </a:r>
+          </a:p>
+          <a:p>
+            <a:pPr lvl="1"/>
+            <a:r>
+              <a:rPr lang="en-US" dirty="0" err="1" smtClean="0"/>
+              <a:t>Fase</a:t>
+            </a:r>
+            <a:r>
+              <a:rPr lang="en-US" dirty="0" smtClean="0"/>
+              <a:t> 1: </a:t>
+            </a:r>
+            <a:r>
+              <a:rPr lang="en-US" dirty="0" err="1" smtClean="0"/>
+              <a:t>Escaneo</a:t>
+            </a:r>
+            <a:r>
+              <a:rPr lang="en-US" dirty="0" smtClean="0"/>
+              <a:t> de </a:t>
+            </a:r>
+            <a:r>
+              <a:rPr lang="en-US" dirty="0" err="1" smtClean="0"/>
+              <a:t>memoria</a:t>
+            </a:r>
+            <a:endParaRPr lang="en-US" dirty="0" smtClean="0"/>
+          </a:p>
+          <a:p>
+            <a:pPr lvl="1"/>
+            <a:r>
+              <a:rPr lang="en-US" dirty="0" err="1" smtClean="0"/>
+              <a:t>Fase</a:t>
+            </a:r>
+            <a:r>
+              <a:rPr lang="en-US" dirty="0" smtClean="0"/>
+              <a:t> 2: </a:t>
+            </a:r>
+            <a:r>
+              <a:rPr lang="en-US" dirty="0" err="1" smtClean="0"/>
+              <a:t>Barrido</a:t>
+            </a:r>
+            <a:r>
+              <a:rPr lang="en-US" dirty="0"/>
+              <a:t> </a:t>
+            </a:r>
+            <a:r>
+              <a:rPr lang="en-US" dirty="0" smtClean="0"/>
+              <a:t>de </a:t>
+            </a:r>
+            <a:r>
+              <a:rPr lang="en-US" dirty="0" err="1" smtClean="0"/>
+              <a:t>bloques</a:t>
+            </a:r>
+            <a:endParaRPr lang="en-US" dirty="0"/>
+          </a:p>
+          <a:p>
+            <a:pPr marL="457200" lvl="1" indent="0">
+              <a:buNone/>
+            </a:pPr>
+            <a:endParaRPr lang="en-US" dirty="0"/>
+          </a:p>
+          <a:p>
+            <a:pPr lvl="1"/>
+            <a:endParaRPr lang="en-US" dirty="0" smtClean="0"/>
+          </a:p>
+          <a:p>
+            <a:pPr lvl="1"/>
             <a:endParaRPr lang="en-US" dirty="0" smtClean="0"/>
           </a:p>
         </p:txBody>

</xml_diff>

<commit_message>
ppt falta metodo 2
</commit_message>
<xml_diff>
--- a/Recolección de Basura en C.pptx
+++ b/Recolección de Basura en C.pptx
@@ -10,8 +10,7 @@
     <p:sldId id="259" r:id="rId4"/>
     <p:sldId id="258" r:id="rId5"/>
     <p:sldId id="260" r:id="rId6"/>
-    <p:sldId id="261" r:id="rId7"/>
-    <p:sldId id="262" r:id="rId8"/>
+    <p:sldId id="262" r:id="rId7"/>
   </p:sldIdLst>
   <p:sldSz cx="12192000" cy="6858000"/>
   <p:notesSz cx="6858000" cy="9144000"/>
@@ -124,7 +123,6 @@
             <p14:sldId id="259"/>
             <p14:sldId id="258"/>
             <p14:sldId id="260"/>
-            <p14:sldId id="261"/>
             <p14:sldId id="262"/>
           </p14:sldIdLst>
         </p14:section>
@@ -268,7 +266,7 @@
           <a:p>
             <a:fld id="{6247CA0C-09F5-4541-B72D-5188874B459F}" type="datetimeFigureOut">
               <a:rPr lang="en-US" smtClean="0"/>
-              <a:t>2/2/2014</a:t>
+              <a:t>2/5/2014</a:t>
             </a:fld>
             <a:endParaRPr lang="en-US"/>
           </a:p>
@@ -438,7 +436,7 @@
           <a:p>
             <a:fld id="{6247CA0C-09F5-4541-B72D-5188874B459F}" type="datetimeFigureOut">
               <a:rPr lang="en-US" smtClean="0"/>
-              <a:t>2/2/2014</a:t>
+              <a:t>2/5/2014</a:t>
             </a:fld>
             <a:endParaRPr lang="en-US"/>
           </a:p>
@@ -618,7 +616,7 @@
           <a:p>
             <a:fld id="{6247CA0C-09F5-4541-B72D-5188874B459F}" type="datetimeFigureOut">
               <a:rPr lang="en-US" smtClean="0"/>
-              <a:t>2/2/2014</a:t>
+              <a:t>2/5/2014</a:t>
             </a:fld>
             <a:endParaRPr lang="en-US"/>
           </a:p>
@@ -788,7 +786,7 @@
           <a:p>
             <a:fld id="{6247CA0C-09F5-4541-B72D-5188874B459F}" type="datetimeFigureOut">
               <a:rPr lang="en-US" smtClean="0"/>
-              <a:t>2/2/2014</a:t>
+              <a:t>2/5/2014</a:t>
             </a:fld>
             <a:endParaRPr lang="en-US"/>
           </a:p>
@@ -1034,7 +1032,7 @@
           <a:p>
             <a:fld id="{6247CA0C-09F5-4541-B72D-5188874B459F}" type="datetimeFigureOut">
               <a:rPr lang="en-US" smtClean="0"/>
-              <a:t>2/2/2014</a:t>
+              <a:t>2/5/2014</a:t>
             </a:fld>
             <a:endParaRPr lang="en-US"/>
           </a:p>
@@ -1266,7 +1264,7 @@
           <a:p>
             <a:fld id="{6247CA0C-09F5-4541-B72D-5188874B459F}" type="datetimeFigureOut">
               <a:rPr lang="en-US" smtClean="0"/>
-              <a:t>2/2/2014</a:t>
+              <a:t>2/5/2014</a:t>
             </a:fld>
             <a:endParaRPr lang="en-US"/>
           </a:p>
@@ -1633,7 +1631,7 @@
           <a:p>
             <a:fld id="{6247CA0C-09F5-4541-B72D-5188874B459F}" type="datetimeFigureOut">
               <a:rPr lang="en-US" smtClean="0"/>
-              <a:t>2/2/2014</a:t>
+              <a:t>2/5/2014</a:t>
             </a:fld>
             <a:endParaRPr lang="en-US"/>
           </a:p>
@@ -1751,7 +1749,7 @@
           <a:p>
             <a:fld id="{6247CA0C-09F5-4541-B72D-5188874B459F}" type="datetimeFigureOut">
               <a:rPr lang="en-US" smtClean="0"/>
-              <a:t>2/2/2014</a:t>
+              <a:t>2/5/2014</a:t>
             </a:fld>
             <a:endParaRPr lang="en-US"/>
           </a:p>
@@ -1846,7 +1844,7 @@
           <a:p>
             <a:fld id="{6247CA0C-09F5-4541-B72D-5188874B459F}" type="datetimeFigureOut">
               <a:rPr lang="en-US" smtClean="0"/>
-              <a:t>2/2/2014</a:t>
+              <a:t>2/5/2014</a:t>
             </a:fld>
             <a:endParaRPr lang="en-US"/>
           </a:p>
@@ -2123,7 +2121,7 @@
           <a:p>
             <a:fld id="{6247CA0C-09F5-4541-B72D-5188874B459F}" type="datetimeFigureOut">
               <a:rPr lang="en-US" smtClean="0"/>
-              <a:t>2/2/2014</a:t>
+              <a:t>2/5/2014</a:t>
             </a:fld>
             <a:endParaRPr lang="en-US"/>
           </a:p>
@@ -2376,7 +2374,7 @@
           <a:p>
             <a:fld id="{6247CA0C-09F5-4541-B72D-5188874B459F}" type="datetimeFigureOut">
               <a:rPr lang="en-US" smtClean="0"/>
-              <a:t>2/2/2014</a:t>
+              <a:t>2/5/2014</a:t>
             </a:fld>
             <a:endParaRPr lang="en-US"/>
           </a:p>
@@ -2589,7 +2587,7 @@
           <a:p>
             <a:fld id="{6247CA0C-09F5-4541-B72D-5188874B459F}" type="datetimeFigureOut">
               <a:rPr lang="en-US" smtClean="0"/>
-              <a:t>2/2/2014</a:t>
+              <a:t>2/5/2014</a:t>
             </a:fld>
             <a:endParaRPr lang="en-US"/>
           </a:p>
@@ -3211,11 +3209,17 @@
           <a:p>
             <a:r>
               <a:rPr lang="en-US" dirty="0" smtClean="0"/>
-              <a:t>Trade-off (Performance &gt; </a:t>
-            </a:r>
-            <a:r>
-              <a:rPr lang="en-US" dirty="0" smtClean="0"/>
-              <a:t>Convenience)</a:t>
+              <a:t>Trade-off (Performance &gt; Convenience</a:t>
+            </a:r>
+            <a:r>
+              <a:rPr lang="en-US" dirty="0" smtClean="0"/>
+              <a:t>)</a:t>
+            </a:r>
+          </a:p>
+          <a:p>
+            <a:r>
+              <a:rPr lang="en-US" dirty="0" err="1" smtClean="0"/>
+              <a:t>Funcionalidad</a:t>
             </a:r>
             <a:endParaRPr lang="en-US" dirty="0" smtClean="0"/>
           </a:p>
@@ -3323,14 +3327,8 @@
           </a:p>
           <a:p>
             <a:r>
-              <a:rPr lang="en-US" dirty="0" smtClean="0"/>
+              <a:rPr lang="en-US" dirty="0"/>
               <a:t>2</a:t>
-            </a:r>
-          </a:p>
-          <a:p>
-            <a:r>
-              <a:rPr lang="en-US" dirty="0" smtClean="0"/>
-              <a:t>3</a:t>
             </a:r>
             <a:endParaRPr lang="en-US" dirty="0" smtClean="0"/>
           </a:p>
@@ -3501,11 +3499,7 @@
             </a:r>
             <a:r>
               <a:rPr lang="en-US" dirty="0" smtClean="0"/>
-              <a:t>. </a:t>
-            </a:r>
-            <a:r>
-              <a:rPr lang="en-US" dirty="0" smtClean="0"/>
-              <a:t>Para </a:t>
+              <a:t>. Para </a:t>
             </a:r>
             <a:r>
               <a:rPr lang="en-US" dirty="0" err="1" smtClean="0"/>
@@ -3794,11 +3788,7 @@
           <a:p>
             <a:r>
               <a:rPr lang="en-US" dirty="0" err="1" smtClean="0"/>
-              <a:t>Metodo</a:t>
-            </a:r>
-            <a:r>
-              <a:rPr lang="en-US" dirty="0" smtClean="0"/>
-              <a:t> 3</a:t>
+              <a:t>Conclusiones</a:t>
             </a:r>
             <a:endParaRPr lang="en-US" dirty="0"/>
           </a:p>
@@ -3820,86 +3810,25 @@
           <a:lstStyle/>
           <a:p>
             <a:r>
-              <a:rPr lang="en-US" dirty="0" err="1" smtClean="0"/>
-              <a:t>blabla</a:t>
-            </a:r>
-            <a:endParaRPr lang="en-US" dirty="0"/>
-          </a:p>
-        </p:txBody>
-      </p:sp>
-    </p:spTree>
-    <p:extLst>
-      <p:ext uri="{BB962C8B-B14F-4D97-AF65-F5344CB8AC3E}">
-        <p14:creationId xmlns:p14="http://schemas.microsoft.com/office/powerpoint/2010/main" val="201609875"/>
-      </p:ext>
-    </p:extLst>
-  </p:cSld>
-  <p:clrMapOvr>
-    <a:masterClrMapping/>
-  </p:clrMapOvr>
-</p:sld>
-</file>
-
-<file path=ppt/slides/slide7.xml><?xml version="1.0" encoding="utf-8"?>
-<p:sld xmlns:a="http://schemas.openxmlformats.org/drawingml/2006/main" xmlns:r="http://schemas.openxmlformats.org/officeDocument/2006/relationships" xmlns:p="http://schemas.openxmlformats.org/presentationml/2006/main">
-  <p:cSld>
-    <p:spTree>
-      <p:nvGrpSpPr>
-        <p:cNvPr id="1" name=""/>
-        <p:cNvGrpSpPr/>
-        <p:nvPr/>
-      </p:nvGrpSpPr>
-      <p:grpSpPr>
-        <a:xfrm>
-          <a:off x="0" y="0"/>
-          <a:ext cx="0" cy="0"/>
-          <a:chOff x="0" y="0"/>
-          <a:chExt cx="0" cy="0"/>
-        </a:xfrm>
-      </p:grpSpPr>
-      <p:sp>
-        <p:nvSpPr>
-          <p:cNvPr id="2" name="Title 1"/>
-          <p:cNvSpPr>
-            <a:spLocks noGrp="1"/>
-          </p:cNvSpPr>
-          <p:nvPr>
-            <p:ph type="title"/>
-          </p:nvPr>
-        </p:nvSpPr>
-        <p:spPr/>
-        <p:txBody>
-          <a:bodyPr/>
-          <a:lstStyle/>
-          <a:p>
-            <a:r>
-              <a:rPr lang="en-US" dirty="0" err="1" smtClean="0"/>
-              <a:t>Conclusiones</a:t>
-            </a:r>
-            <a:endParaRPr lang="en-US" dirty="0"/>
-          </a:p>
-        </p:txBody>
-      </p:sp>
-      <p:sp>
-        <p:nvSpPr>
-          <p:cNvPr id="3" name="Content Placeholder 2"/>
-          <p:cNvSpPr>
-            <a:spLocks noGrp="1"/>
-          </p:cNvSpPr>
-          <p:nvPr>
-            <p:ph idx="1"/>
-          </p:nvPr>
-        </p:nvSpPr>
-        <p:spPr/>
-        <p:txBody>
-          <a:bodyPr/>
-          <a:lstStyle/>
-          <a:p>
-            <a:r>
-              <a:rPr lang="en-US" dirty="0" err="1" smtClean="0"/>
-              <a:t>blabla</a:t>
-            </a:r>
-            <a:endParaRPr lang="en-US" dirty="0"/>
+              <a:rPr lang="en-US" dirty="0" smtClean="0"/>
+              <a:t>No </a:t>
+            </a:r>
+            <a:r>
+              <a:rPr lang="en-US" dirty="0" err="1" smtClean="0"/>
+              <a:t>tomar</a:t>
+            </a:r>
+            <a:r>
+              <a:rPr lang="en-US" dirty="0" smtClean="0"/>
+              <a:t> un </a:t>
+            </a:r>
+            <a:r>
+              <a:rPr lang="en-US" dirty="0" err="1" smtClean="0"/>
+              <a:t>avión</a:t>
+            </a:r>
+            <a:r>
+              <a:rPr lang="en-US" dirty="0" smtClean="0"/>
+              <a:t> a casa</a:t>
+            </a:r>
           </a:p>
         </p:txBody>
       </p:sp>

</xml_diff>

<commit_message>
img size y ppt
</commit_message>
<xml_diff>
--- a/Recolección de Basura en C.pptx
+++ b/Recolección de Basura en C.pptx
@@ -141,7 +141,18 @@
       </p14:sectionLst>
     </p:ext>
     <p:ext uri="{EFAFB233-063F-42B5-8137-9DF3F51BA10A}">
-      <p15:sldGuideLst xmlns="" xmlns:p15="http://schemas.microsoft.com/office/powerpoint/2012/main"/>
+      <p15:sldGuideLst xmlns:p15="http://schemas.microsoft.com/office/powerpoint/2012/main">
+        <p15:guide id="1" orient="horz" pos="2160">
+          <p15:clr>
+            <a:srgbClr val="A4A3A4"/>
+          </p15:clr>
+        </p15:guide>
+        <p15:guide id="2" pos="3840">
+          <p15:clr>
+            <a:srgbClr val="A4A3A4"/>
+          </p15:clr>
+        </p15:guide>
+      </p15:sldGuideLst>
     </p:ext>
   </p:extLst>
 </p:presentation>
@@ -4493,7 +4504,11 @@
           <a:bodyPr/>
           <a:lstStyle/>
           <a:p>
-            <a:endParaRPr lang="es-EC"/>
+            <a:r>
+              <a:rPr lang="en-US" dirty="0" err="1" smtClean="0"/>
+              <a:t>Conclusiones</a:t>
+            </a:r>
+            <a:endParaRPr lang="es-EC" dirty="0"/>
           </a:p>
         </p:txBody>
       </p:sp>
@@ -4512,7 +4527,29 @@
           <a:bodyPr/>
           <a:lstStyle/>
           <a:p>
-            <a:endParaRPr lang="es-EC"/>
+            <a:r>
+              <a:rPr lang="en-US" dirty="0" smtClean="0"/>
+              <a:t>No </a:t>
+            </a:r>
+            <a:r>
+              <a:rPr lang="en-US" dirty="0" err="1" smtClean="0"/>
+              <a:t>tomar</a:t>
+            </a:r>
+            <a:r>
+              <a:rPr lang="en-US" dirty="0" smtClean="0"/>
+              <a:t> un </a:t>
+            </a:r>
+            <a:r>
+              <a:rPr lang="en-US" dirty="0" err="1" smtClean="0"/>
+              <a:t>avión</a:t>
+            </a:r>
+            <a:r>
+              <a:rPr lang="en-US" dirty="0" smtClean="0"/>
+              <a:t> a casa.</a:t>
+            </a:r>
+          </a:p>
+          <a:p>
+            <a:endParaRPr lang="es-EC" dirty="0"/>
           </a:p>
         </p:txBody>
       </p:sp>
@@ -4600,16 +4637,11 @@
               <a:rPr lang="en-US" dirty="0" smtClean="0"/>
               <a:t> </a:t>
             </a:r>
-            <a:endParaRPr lang="en-US" dirty="0" smtClean="0"/>
           </a:p>
           <a:p>
             <a:r>
               <a:rPr lang="en-US" dirty="0" smtClean="0"/>
-              <a:t>Overhead </a:t>
-            </a:r>
-            <a:r>
-              <a:rPr lang="en-US" dirty="0" smtClean="0"/>
-              <a:t>en </a:t>
+              <a:t>Overhead en </a:t>
             </a:r>
             <a:r>
               <a:rPr lang="en-US" dirty="0" err="1" smtClean="0"/>
@@ -4639,11 +4671,7 @@
           <a:p>
             <a:r>
               <a:rPr lang="en-US" dirty="0" smtClean="0"/>
-              <a:t>Trade-off (Performance &gt; Convenience</a:t>
-            </a:r>
-            <a:r>
-              <a:rPr lang="en-US" dirty="0" smtClean="0"/>
-              <a:t>)</a:t>
+              <a:t>Trade-off (Performance &gt; Convenience)</a:t>
             </a:r>
           </a:p>
           <a:p>
@@ -4805,7 +4833,7 @@
         </p:nvSpPr>
         <p:spPr>
           <a:xfrm>
-            <a:off x="838200" y="365125"/>
+            <a:off x="1472585" y="208715"/>
             <a:ext cx="10880558" cy="1325563"/>
           </a:xfrm>
         </p:spPr>
@@ -5352,6 +5380,50 @@
             </a:r>
           </a:p>
           <a:p>
+            <a:endParaRPr lang="es-EC" dirty="0"/>
+          </a:p>
+          <a:p>
+            <a:r>
+              <a:rPr lang="es-EC" dirty="0"/>
+              <a:t>Maximizar Portabilidad, es decir, depender lo menos posible de características dependientes del Sistema como </a:t>
+            </a:r>
+            <a:r>
+              <a:rPr lang="es-EC" dirty="0" err="1"/>
+              <a:t>system</a:t>
+            </a:r>
+            <a:r>
+              <a:rPr lang="es-EC" dirty="0"/>
+              <a:t> </a:t>
+            </a:r>
+            <a:r>
+              <a:rPr lang="es-EC" dirty="0" err="1"/>
+              <a:t>calls</a:t>
+            </a:r>
+            <a:r>
+              <a:rPr lang="es-EC" dirty="0"/>
+              <a:t>, </a:t>
+            </a:r>
+            <a:r>
+              <a:rPr lang="es-EC" dirty="0" smtClean="0"/>
+              <a:t>además </a:t>
+            </a:r>
+            <a:r>
+              <a:rPr lang="es-EC" dirty="0"/>
+              <a:t>de conformarse a todos los </a:t>
+            </a:r>
+            <a:r>
+              <a:rPr lang="es-EC" dirty="0" err="1"/>
+              <a:t>constraints</a:t>
+            </a:r>
+            <a:r>
+              <a:rPr lang="es-EC" dirty="0"/>
+              <a:t> conocidos del Sistema.</a:t>
+            </a:r>
+          </a:p>
+          <a:p>
+            <a:pPr marL="82296" indent="0">
+              <a:buNone/>
+            </a:pPr>
             <a:r>
               <a:rPr lang="es-EC" dirty="0"/>
               <a:t> </a:t>
@@ -5360,42 +5432,21 @@
           <a:p>
             <a:r>
               <a:rPr lang="es-EC" dirty="0"/>
-              <a:t>Maximizar Portabilidad, es decir, depender lo menos posible de características dependientes del Sistema como </a:t>
+              <a:t>Minimizar el Espacio. Esto se refiere a que el </a:t>
             </a:r>
             <a:r>
               <a:rPr lang="es-EC" dirty="0" err="1"/>
-              <a:t>system</a:t>
+              <a:t>allocator</a:t>
             </a:r>
             <a:r>
               <a:rPr lang="es-EC" dirty="0"/>
-              <a:t> </a:t>
-            </a:r>
-            <a:r>
-              <a:rPr lang="es-EC" dirty="0" err="1"/>
-              <a:t>calls</a:t>
-            </a:r>
-            <a:r>
-              <a:rPr lang="es-EC" dirty="0"/>
-              <a:t>, </a:t>
-            </a:r>
-            <a:r>
-              <a:rPr lang="es-EC" dirty="0" err="1"/>
-              <a:t>ademas</a:t>
-            </a:r>
-            <a:r>
-              <a:rPr lang="es-EC" dirty="0"/>
-              <a:t> de conformarse a todos los </a:t>
-            </a:r>
-            <a:r>
-              <a:rPr lang="es-EC" dirty="0" err="1"/>
-              <a:t>constraints</a:t>
-            </a:r>
-            <a:r>
-              <a:rPr lang="es-EC" dirty="0"/>
-              <a:t> conocidos del Sistema.</a:t>
-            </a:r>
-          </a:p>
-          <a:p>
+              <a:t> no debe desperdiciar memoria. Debe obtener la mínima cantidad de memoria que sea posible y mantener la misma de tal manera que se minimiza la fragmentación de la misma.</a:t>
+            </a:r>
+          </a:p>
+          <a:p>
+            <a:pPr marL="82296" indent="0">
+              <a:buNone/>
+            </a:pPr>
             <a:r>
               <a:rPr lang="es-EC" dirty="0"/>
               <a:t> </a:t>
@@ -5404,26 +5455,6 @@
           <a:p>
             <a:r>
               <a:rPr lang="es-EC" dirty="0"/>
-              <a:t>Minimizar el Espacio. Esto se refiere a que el </a:t>
-            </a:r>
-            <a:r>
-              <a:rPr lang="es-EC" dirty="0" err="1"/>
-              <a:t>allocator</a:t>
-            </a:r>
-            <a:r>
-              <a:rPr lang="es-EC" dirty="0"/>
-              <a:t> no debe desperdiciar memoria. Debe obtener la mínima cantidad de memoria que sea posible y mantener la misma de tal manera que se minimiza la fragmentación de la misma.</a:t>
-            </a:r>
-          </a:p>
-          <a:p>
-            <a:r>
-              <a:rPr lang="es-EC" dirty="0"/>
-              <a:t> </a:t>
-            </a:r>
-          </a:p>
-          <a:p>
-            <a:r>
-              <a:rPr lang="es-EC" dirty="0"/>
               <a:t>Minimizar el Tiempo. Quiere decir que </a:t>
             </a:r>
             <a:r>
@@ -5452,10 +5483,7 @@
             </a:r>
           </a:p>
           <a:p>
-            <a:r>
-              <a:rPr lang="es-EC" dirty="0"/>
-              <a:t> </a:t>
-            </a:r>
+            <a:endParaRPr lang="es-EC" dirty="0"/>
           </a:p>
           <a:p>
             <a:pPr marL="82296" indent="0">
@@ -5580,10 +5608,6 @@
             </a:r>
           </a:p>
           <a:p>
-            <a:r>
-              <a:rPr lang="en-US" dirty="0"/>
-              <a:t> </a:t>
-            </a:r>
             <a:endParaRPr lang="es-EC" dirty="0"/>
           </a:p>
           <a:p>
@@ -5593,6 +5617,9 @@
             </a:r>
           </a:p>
           <a:p>
+            <a:pPr marL="82296" indent="0">
+              <a:buNone/>
+            </a:pPr>
             <a:r>
               <a:rPr lang="es-EC" dirty="0"/>
               <a:t>  </a:t>
@@ -5621,6 +5648,9 @@
             </a:r>
           </a:p>
           <a:p>
+            <a:pPr marL="82296" indent="0">
+              <a:buNone/>
+            </a:pPr>
             <a:r>
               <a:rPr lang="es-EC" dirty="0"/>
               <a:t> </a:t>
@@ -5671,7 +5701,6 @@
               <a:rPr lang="es-EC" dirty="0"/>
               <a:t> …</a:t>
             </a:r>
-            <a:endParaRPr lang="es-EC" dirty="0"/>
           </a:p>
         </p:txBody>
       </p:sp>
@@ -5781,13 +5810,10 @@
           </a:p>
           <a:p>
             <a:r>
-              <a:rPr lang="en-US" dirty="0" err="1" smtClean="0"/>
-              <a:t>Bounday</a:t>
-            </a:r>
-            <a:r>
               <a:rPr lang="en-US" dirty="0" smtClean="0"/>
-              <a:t> Tag </a:t>
-            </a:r>
+              <a:t>Boundary Tag </a:t>
+            </a:r>
+            <a:endParaRPr lang="en-US" dirty="0" smtClean="0"/>
           </a:p>
           <a:p>
             <a:r>
@@ -5905,7 +5931,7 @@
         <a:sysClr val="windowText" lastClr="000000"/>
       </a:dk1>
       <a:lt1>
-        <a:sysClr val="window" lastClr="FFFFFF"/>
+        <a:sysClr val="window" lastClr="F9F9F9"/>
       </a:lt1>
       <a:dk2>
         <a:srgbClr val="4F271C"/>

</xml_diff>